<commit_message>
Fixed a typo in Lab 9 starter code
</commit_message>
<xml_diff>
--- a/Lab 9/CS 341 Lab 9.pptx
+++ b/Lab 9/CS 341 Lab 9.pptx
@@ -4034,8 +4034,8 @@
           </a:p>
         </p:txBody>
       </p:sp>
-      <mc:AlternateContent xmlns:mc="http://schemas.openxmlformats.org/markup-compatibility/2006">
-        <mc:Choice xmlns:a14="http://schemas.microsoft.com/office/drawing/2010/main" Requires="a14">
+      <mc:AlternateContent xmlns:mc="http://schemas.openxmlformats.org/markup-compatibility/2006" xmlns:a14="http://schemas.microsoft.com/office/drawing/2010/main">
+        <mc:Choice Requires="a14">
           <p:sp>
             <p:nvSpPr>
               <p:cNvPr id="3" name="Content Placeholder 2">
@@ -4067,26 +4067,36 @@
                 <a14:m>
                   <m:oMath xmlns:m="http://schemas.openxmlformats.org/officeDocument/2006/math">
                     <m:r>
-                      <a:rPr lang="en-US" i="1"/>
+                      <a:rPr lang="en-US" i="1">
+                        <a:latin typeface="Cambria Math" panose="02040503050406030204" pitchFamily="18" charset="0"/>
+                      </a:rPr>
                       <m:t>𝑉</m:t>
                     </m:r>
                     <m:r>
-                      <a:rPr lang="en-US" i="1"/>
+                      <a:rPr lang="en-US" i="1">
+                        <a:latin typeface="Cambria Math" panose="02040503050406030204" pitchFamily="18" charset="0"/>
+                      </a:rPr>
                       <m:t>=</m:t>
                     </m:r>
                     <m:f>
                       <m:fPr>
                         <m:ctrlPr>
-                          <a:rPr lang="en-US" i="1"/>
+                          <a:rPr lang="en-US" i="1">
+                            <a:latin typeface="Cambria Math" panose="02040503050406030204" pitchFamily="18" charset="0"/>
+                          </a:rPr>
                         </m:ctrlPr>
                       </m:fPr>
                       <m:num>
                         <m:r>
-                          <a:rPr lang="en-US" i="1"/>
+                          <a:rPr lang="en-US" i="1">
+                            <a:latin typeface="Cambria Math" panose="02040503050406030204" pitchFamily="18" charset="0"/>
+                          </a:rPr>
                           <m:t>∆</m:t>
                         </m:r>
                         <m:r>
-                          <a:rPr lang="en-US" i="1"/>
+                          <a:rPr lang="en-US" i="1">
+                            <a:latin typeface="Cambria Math" panose="02040503050406030204" pitchFamily="18" charset="0"/>
+                          </a:rPr>
                           <m:t>𝑑</m:t>
                         </m:r>
                       </m:num>
@@ -4095,11 +4105,15 @@
                           <m:rPr>
                             <m:sty m:val="p"/>
                           </m:rPr>
-                          <a:rPr lang="en-US"/>
+                          <a:rPr lang="en-US">
+                            <a:latin typeface="Cambria Math" panose="02040503050406030204" pitchFamily="18" charset="0"/>
+                          </a:rPr>
                           <m:t>Δ</m:t>
                         </m:r>
                         <m:r>
-                          <a:rPr lang="en-US" i="1"/>
+                          <a:rPr lang="en-US" i="1">
+                            <a:latin typeface="Cambria Math" panose="02040503050406030204" pitchFamily="18" charset="0"/>
+                          </a:rPr>
                           <m:t>𝑡</m:t>
                         </m:r>
                       </m:den>
@@ -4144,7 +4158,7 @@
             </p:txBody>
           </p:sp>
         </mc:Choice>
-        <mc:Fallback>
+        <mc:Fallback xmlns="">
           <p:sp>
             <p:nvSpPr>
               <p:cNvPr id="3" name="Content Placeholder 2">

</xml_diff>